<commit_message>
Add negative star icon
</commit_message>
<xml_diff>
--- a/img/logo.pptx
+++ b/img/logo.pptx
@@ -104,6 +104,11 @@
       </a:defRPr>
     </a:lvl9pPr>
   </p:defaultTextStyle>
+  <p:extLst>
+    <p:ext uri="{EFAFB233-063F-42B5-8137-9DF3F51BA10A}">
+      <p15:sldGuideLst xmlns:p15="http://schemas.microsoft.com/office/powerpoint/2012/main"/>
+    </p:ext>
+  </p:extLst>
 </p:presentation>
 </file>
 
@@ -3701,6 +3706,350 @@
           </a:p>
         </p:txBody>
       </p:sp>
+      <p:sp>
+        <p:nvSpPr>
+          <p:cNvPr id="10" name="Rectangle 9">
+            <a:extLst>
+              <a:ext uri="{FF2B5EF4-FFF2-40B4-BE49-F238E27FC236}">
+                <a16:creationId xmlns:a16="http://schemas.microsoft.com/office/drawing/2014/main" id="{AAA24AA8-4A57-484A-806C-DDCA510AFE32}"/>
+              </a:ext>
+            </a:extLst>
+          </p:cNvPr>
+          <p:cNvSpPr/>
+          <p:nvPr/>
+        </p:nvSpPr>
+        <p:spPr>
+          <a:xfrm>
+            <a:off x="8879955" y="4326367"/>
+            <a:ext cx="2224324" cy="2224324"/>
+          </a:xfrm>
+          <a:prstGeom prst="rect">
+            <a:avLst/>
+          </a:prstGeom>
+          <a:gradFill>
+            <a:gsLst>
+              <a:gs pos="0">
+                <a:srgbClr val="FE934D"/>
+              </a:gs>
+              <a:gs pos="38000">
+                <a:srgbClr val="FEAF50"/>
+              </a:gs>
+              <a:gs pos="86000">
+                <a:srgbClr val="FF0066"/>
+              </a:gs>
+              <a:gs pos="100000">
+                <a:srgbClr val="FF0066"/>
+              </a:gs>
+            </a:gsLst>
+            <a:lin ang="4320000" scaled="0"/>
+          </a:gradFill>
+          <a:ln>
+            <a:noFill/>
+          </a:ln>
+        </p:spPr>
+        <p:style>
+          <a:lnRef idx="2">
+            <a:schemeClr val="accent1">
+              <a:shade val="50000"/>
+            </a:schemeClr>
+          </a:lnRef>
+          <a:fillRef idx="1">
+            <a:schemeClr val="accent1"/>
+          </a:fillRef>
+          <a:effectRef idx="0">
+            <a:schemeClr val="accent1"/>
+          </a:effectRef>
+          <a:fontRef idx="minor">
+            <a:schemeClr val="lt1"/>
+          </a:fontRef>
+        </p:style>
+        <p:txBody>
+          <a:bodyPr rtlCol="0" anchor="ctr"/>
+          <a:lstStyle/>
+          <a:p>
+            <a:pPr algn="ctr"/>
+            <a:endParaRPr lang="en-US"/>
+          </a:p>
+        </p:txBody>
+      </p:sp>
+      <p:grpSp>
+        <p:nvGrpSpPr>
+          <p:cNvPr id="11" name="Group 10">
+            <a:extLst>
+              <a:ext uri="{FF2B5EF4-FFF2-40B4-BE49-F238E27FC236}">
+                <a16:creationId xmlns:a16="http://schemas.microsoft.com/office/drawing/2014/main" id="{3000AF52-818D-49AE-B711-B58D31F42CDE}"/>
+              </a:ext>
+            </a:extLst>
+          </p:cNvPr>
+          <p:cNvGrpSpPr/>
+          <p:nvPr/>
+        </p:nvGrpSpPr>
+        <p:grpSpPr>
+          <a:xfrm rot="18000000">
+            <a:off x="8938486" y="4466991"/>
+            <a:ext cx="1974919" cy="1943076"/>
+            <a:chOff x="5370366" y="416666"/>
+            <a:chExt cx="1962130" cy="1930491"/>
+          </a:xfrm>
+          <a:solidFill>
+            <a:schemeClr val="bg1"/>
+          </a:solidFill>
+        </p:grpSpPr>
+        <p:sp>
+          <p:nvSpPr>
+            <p:cNvPr id="12" name="Flowchart: Merge 15">
+              <a:extLst>
+                <a:ext uri="{FF2B5EF4-FFF2-40B4-BE49-F238E27FC236}">
+                  <a16:creationId xmlns:a16="http://schemas.microsoft.com/office/drawing/2014/main" id="{664EFC14-2FE6-4338-877B-FE31F313D99C}"/>
+                </a:ext>
+              </a:extLst>
+            </p:cNvPr>
+            <p:cNvSpPr/>
+            <p:nvPr/>
+          </p:nvSpPr>
+          <p:spPr>
+            <a:xfrm flipH="1" flipV="1">
+              <a:off x="5831067" y="416666"/>
+              <a:ext cx="1031846" cy="914400"/>
+            </a:xfrm>
+            <a:prstGeom prst="heart">
+              <a:avLst/>
+            </a:prstGeom>
+            <a:grpFill/>
+            <a:ln>
+              <a:noFill/>
+            </a:ln>
+          </p:spPr>
+          <p:style>
+            <a:lnRef idx="2">
+              <a:schemeClr val="accent1">
+                <a:shade val="50000"/>
+              </a:schemeClr>
+            </a:lnRef>
+            <a:fillRef idx="1">
+              <a:schemeClr val="accent1"/>
+            </a:fillRef>
+            <a:effectRef idx="0">
+              <a:schemeClr val="accent1"/>
+            </a:effectRef>
+            <a:fontRef idx="minor">
+              <a:schemeClr val="lt1"/>
+            </a:fontRef>
+          </p:style>
+          <p:txBody>
+            <a:bodyPr rtlCol="0" anchor="ctr"/>
+            <a:lstStyle/>
+            <a:p>
+              <a:pPr algn="ctr"/>
+              <a:endParaRPr lang="en-US"/>
+            </a:p>
+          </p:txBody>
+        </p:sp>
+        <p:sp>
+          <p:nvSpPr>
+            <p:cNvPr id="13" name="Flowchart: Merge 18">
+              <a:extLst>
+                <a:ext uri="{FF2B5EF4-FFF2-40B4-BE49-F238E27FC236}">
+                  <a16:creationId xmlns:a16="http://schemas.microsoft.com/office/drawing/2014/main" id="{49CCCB32-67D6-4BF7-A391-0E2975C20C54}"/>
+                </a:ext>
+              </a:extLst>
+            </p:cNvPr>
+            <p:cNvSpPr/>
+            <p:nvPr/>
+          </p:nvSpPr>
+          <p:spPr>
+            <a:xfrm rot="17280000" flipV="1">
+              <a:off x="5311642" y="825520"/>
+              <a:ext cx="1031847" cy="914399"/>
+            </a:xfrm>
+            <a:prstGeom prst="heart">
+              <a:avLst/>
+            </a:prstGeom>
+            <a:grpFill/>
+            <a:ln>
+              <a:noFill/>
+            </a:ln>
+          </p:spPr>
+          <p:style>
+            <a:lnRef idx="2">
+              <a:schemeClr val="accent1">
+                <a:shade val="50000"/>
+              </a:schemeClr>
+            </a:lnRef>
+            <a:fillRef idx="1">
+              <a:schemeClr val="accent1"/>
+            </a:fillRef>
+            <a:effectRef idx="0">
+              <a:schemeClr val="accent1"/>
+            </a:effectRef>
+            <a:fontRef idx="minor">
+              <a:schemeClr val="lt1"/>
+            </a:fontRef>
+          </p:style>
+          <p:txBody>
+            <a:bodyPr rtlCol="0" anchor="ctr"/>
+            <a:lstStyle/>
+            <a:p>
+              <a:pPr algn="ctr"/>
+              <a:endParaRPr lang="en-US"/>
+            </a:p>
+          </p:txBody>
+        </p:sp>
+        <p:sp>
+          <p:nvSpPr>
+            <p:cNvPr id="14" name="Flowchart: Merge 19">
+              <a:extLst>
+                <a:ext uri="{FF2B5EF4-FFF2-40B4-BE49-F238E27FC236}">
+                  <a16:creationId xmlns:a16="http://schemas.microsoft.com/office/drawing/2014/main" id="{69FE1CD3-4487-4F87-B368-533371F2CD38}"/>
+                </a:ext>
+              </a:extLst>
+            </p:cNvPr>
+            <p:cNvSpPr/>
+            <p:nvPr/>
+          </p:nvSpPr>
+          <p:spPr>
+            <a:xfrm rot="12960000" flipV="1">
+              <a:off x="5532727" y="1432757"/>
+              <a:ext cx="1031846" cy="914400"/>
+            </a:xfrm>
+            <a:prstGeom prst="heart">
+              <a:avLst/>
+            </a:prstGeom>
+            <a:grpFill/>
+            <a:ln>
+              <a:noFill/>
+            </a:ln>
+          </p:spPr>
+          <p:style>
+            <a:lnRef idx="2">
+              <a:schemeClr val="accent1">
+                <a:shade val="50000"/>
+              </a:schemeClr>
+            </a:lnRef>
+            <a:fillRef idx="1">
+              <a:schemeClr val="accent1"/>
+            </a:fillRef>
+            <a:effectRef idx="0">
+              <a:schemeClr val="accent1"/>
+            </a:effectRef>
+            <a:fontRef idx="minor">
+              <a:schemeClr val="lt1"/>
+            </a:fontRef>
+          </p:style>
+          <p:txBody>
+            <a:bodyPr rtlCol="0" anchor="ctr"/>
+            <a:lstStyle/>
+            <a:p>
+              <a:pPr algn="ctr"/>
+              <a:endParaRPr lang="en-US"/>
+            </a:p>
+          </p:txBody>
+        </p:sp>
+        <p:sp>
+          <p:nvSpPr>
+            <p:cNvPr id="15" name="Flowchart: Merge 17">
+              <a:extLst>
+                <a:ext uri="{FF2B5EF4-FFF2-40B4-BE49-F238E27FC236}">
+                  <a16:creationId xmlns:a16="http://schemas.microsoft.com/office/drawing/2014/main" id="{CF5F15BF-8965-4CC1-9898-AEB568022A76}"/>
+                </a:ext>
+              </a:extLst>
+            </p:cNvPr>
+            <p:cNvSpPr/>
+            <p:nvPr/>
+          </p:nvSpPr>
+          <p:spPr>
+            <a:xfrm rot="8640000" flipH="1" flipV="1">
+              <a:off x="6167262" y="1421760"/>
+              <a:ext cx="1031846" cy="914400"/>
+            </a:xfrm>
+            <a:prstGeom prst="heart">
+              <a:avLst/>
+            </a:prstGeom>
+            <a:grpFill/>
+            <a:ln>
+              <a:noFill/>
+            </a:ln>
+          </p:spPr>
+          <p:style>
+            <a:lnRef idx="2">
+              <a:schemeClr val="accent1">
+                <a:shade val="50000"/>
+              </a:schemeClr>
+            </a:lnRef>
+            <a:fillRef idx="1">
+              <a:schemeClr val="accent1"/>
+            </a:fillRef>
+            <a:effectRef idx="0">
+              <a:schemeClr val="accent1"/>
+            </a:effectRef>
+            <a:fontRef idx="minor">
+              <a:schemeClr val="lt1"/>
+            </a:fontRef>
+          </p:style>
+          <p:txBody>
+            <a:bodyPr rtlCol="0" anchor="ctr"/>
+            <a:lstStyle/>
+            <a:p>
+              <a:pPr algn="ctr"/>
+              <a:endParaRPr lang="en-US"/>
+            </a:p>
+          </p:txBody>
+        </p:sp>
+        <p:sp>
+          <p:nvSpPr>
+            <p:cNvPr id="21" name="Flowchart: Merge 16">
+              <a:extLst>
+                <a:ext uri="{FF2B5EF4-FFF2-40B4-BE49-F238E27FC236}">
+                  <a16:creationId xmlns:a16="http://schemas.microsoft.com/office/drawing/2014/main" id="{5F1A84EA-5D8C-4B29-92CB-EBA1329E72F7}"/>
+                </a:ext>
+              </a:extLst>
+            </p:cNvPr>
+            <p:cNvSpPr/>
+            <p:nvPr/>
+          </p:nvSpPr>
+          <p:spPr>
+            <a:xfrm rot="4320000" flipH="1" flipV="1">
+              <a:off x="6359373" y="803241"/>
+              <a:ext cx="1031847" cy="914399"/>
+            </a:xfrm>
+            <a:prstGeom prst="heart">
+              <a:avLst/>
+            </a:prstGeom>
+            <a:grpFill/>
+            <a:ln>
+              <a:noFill/>
+            </a:ln>
+          </p:spPr>
+          <p:style>
+            <a:lnRef idx="2">
+              <a:schemeClr val="accent1">
+                <a:shade val="50000"/>
+              </a:schemeClr>
+            </a:lnRef>
+            <a:fillRef idx="1">
+              <a:schemeClr val="accent1"/>
+            </a:fillRef>
+            <a:effectRef idx="0">
+              <a:schemeClr val="accent1"/>
+            </a:effectRef>
+            <a:fontRef idx="minor">
+              <a:schemeClr val="lt1"/>
+            </a:fontRef>
+          </p:style>
+          <p:txBody>
+            <a:bodyPr rtlCol="0" anchor="ctr"/>
+            <a:lstStyle/>
+            <a:p>
+              <a:pPr algn="ctr"/>
+              <a:endParaRPr lang="en-US">
+                <a:solidFill>
+                  <a:srgbClr val="FE7B4D"/>
+                </a:solidFill>
+              </a:endParaRPr>
+            </a:p>
+          </p:txBody>
+        </p:sp>
+      </p:grpSp>
     </p:spTree>
     <p:extLst>
       <p:ext uri="{BB962C8B-B14F-4D97-AF65-F5344CB8AC3E}">

</xml_diff>

<commit_message>
Update logo font to TW Cen MT Bold Italic
</commit_message>
<xml_diff>
--- a/img/logo.pptx
+++ b/img/logo.pptx
@@ -3340,8 +3340,8 @@
         </p:nvSpPr>
         <p:spPr>
           <a:xfrm>
-            <a:off x="1271408" y="2154338"/>
-            <a:ext cx="7840608" cy="1569660"/>
+            <a:off x="2090253" y="2154338"/>
+            <a:ext cx="6202917" cy="1569660"/>
           </a:xfrm>
           <a:prstGeom prst="rect">
             <a:avLst/>
@@ -3361,7 +3361,7 @@
                 <a:solidFill>
                   <a:srgbClr val="3F4140"/>
                 </a:solidFill>
-                <a:latin typeface="Century Gothic" panose="020B0502020202020204" pitchFamily="34" charset="0"/>
+                <a:latin typeface="Tw Cen MT" panose="020B0602020104020603" pitchFamily="34" charset="0"/>
                 <a:ea typeface="Open Sans" panose="020B0606030504020204" pitchFamily="34" charset="0"/>
                 <a:cs typeface="Open Sans" panose="020B0606030504020204" pitchFamily="34" charset="0"/>
               </a:rPr>
@@ -3372,7 +3372,7 @@
               <a:solidFill>
                 <a:srgbClr val="3F4140"/>
               </a:solidFill>
-              <a:latin typeface="Century Gothic" panose="020B0502020202020204" pitchFamily="34" charset="0"/>
+              <a:latin typeface="Tw Cen MT" panose="020B0602020104020603" pitchFamily="34" charset="0"/>
               <a:ea typeface="Open Sans" panose="020B0606030504020204" pitchFamily="34" charset="0"/>
               <a:cs typeface="Open Sans" panose="020B0606030504020204" pitchFamily="34" charset="0"/>
             </a:endParaRPr>
@@ -3393,7 +3393,7 @@
         </p:nvGrpSpPr>
         <p:grpSpPr>
           <a:xfrm rot="18000000">
-            <a:off x="8932049" y="1974631"/>
+            <a:off x="8076373" y="1967630"/>
             <a:ext cx="1974919" cy="1943076"/>
             <a:chOff x="5370366" y="416666"/>
             <a:chExt cx="1962130" cy="1930491"/>
@@ -3678,8 +3678,8 @@
         </p:nvSpPr>
         <p:spPr>
           <a:xfrm>
-            <a:off x="41519" y="6410131"/>
-            <a:ext cx="5560818" cy="369332"/>
+            <a:off x="83464" y="6211669"/>
+            <a:ext cx="5560818" cy="646331"/>
           </a:xfrm>
           <a:prstGeom prst="rect">
             <a:avLst/>
@@ -3703,6 +3703,12 @@
               <a:t>https://www.instagram.com/p/B1VyYMDgF2Q/</a:t>
             </a:r>
             <a:endParaRPr lang="en-US" dirty="0"/>
+          </a:p>
+          <a:p>
+            <a:r>
+              <a:rPr lang="en-US" dirty="0"/>
+              <a:t>Font: TW Cen MT Bold Italic</a:t>
+            </a:r>
           </a:p>
         </p:txBody>
       </p:sp>

</xml_diff>